<commit_message>
Kapitel 6 Datensatzgenerierung und -erweiterung
</commit_message>
<xml_diff>
--- a/Seminar/Bachelorseminar_02-07-2023.pptx
+++ b/Seminar/Bachelorseminar_02-07-2023.pptx
@@ -219,7 +219,7 @@
           <a:p>
             <a:fld id="{A2DD4E1C-547B-4546-95CE-121FDA015484}" type="datetimeFigureOut">
               <a:rPr lang="de-DE" smtClean="0"/>
-              <a:t>21.07.2023</a:t>
+              <a:t>02.08.2023</a:t>
             </a:fld>
             <a:endParaRPr lang="de-DE"/>
           </a:p>
@@ -1384,7 +1384,7 @@
             <a:fld id="{6F1E101A-BD3B-B542-8690-1916D72F307E}" type="datetime1">
               <a:rPr lang="de-DE" smtClean="0"/>
               <a:pPr/>
-              <a:t>21.07.2023</a:t>
+              <a:t>02.08.2023</a:t>
             </a:fld>
             <a:endParaRPr lang="de-DE" dirty="0"/>
           </a:p>
@@ -1540,7 +1540,7 @@
           <a:p>
             <a:fld id="{8F26348B-845F-9447-ACF0-EB8A1B8AE0E8}" type="datetime1">
               <a:rPr lang="de-DE" smtClean="0"/>
-              <a:t>21.07.2023</a:t>
+              <a:t>02.08.2023</a:t>
             </a:fld>
             <a:endParaRPr lang="de-DE" dirty="0"/>
           </a:p>
@@ -1793,7 +1793,7 @@
           <a:p>
             <a:fld id="{6F1E101A-BD3B-B542-8690-1916D72F307E}" type="datetime1">
               <a:rPr lang="de-DE" smtClean="0"/>
-              <a:t>21.07.2023</a:t>
+              <a:t>02.08.2023</a:t>
             </a:fld>
             <a:endParaRPr lang="de-DE" dirty="0"/>
           </a:p>
@@ -2032,7 +2032,7 @@
           <a:p>
             <a:fld id="{6F1E101A-BD3B-B542-8690-1916D72F307E}" type="datetime1">
               <a:rPr lang="de-DE" smtClean="0"/>
-              <a:t>21.07.2023</a:t>
+              <a:t>02.08.2023</a:t>
             </a:fld>
             <a:endParaRPr lang="de-DE" dirty="0"/>
           </a:p>
@@ -2418,7 +2418,7 @@
           <a:p>
             <a:fld id="{6F1E101A-BD3B-B542-8690-1916D72F307E}" type="datetime1">
               <a:rPr lang="de-DE" smtClean="0"/>
-              <a:t>21.07.2023</a:t>
+              <a:t>02.08.2023</a:t>
             </a:fld>
             <a:endParaRPr lang="de-DE" dirty="0"/>
           </a:p>
@@ -2767,7 +2767,7 @@
           <a:p>
             <a:fld id="{6F1E101A-BD3B-B542-8690-1916D72F307E}" type="datetime1">
               <a:rPr lang="de-DE" smtClean="0"/>
-              <a:t>21.07.2023</a:t>
+              <a:t>02.08.2023</a:t>
             </a:fld>
             <a:endParaRPr lang="de-DE" dirty="0"/>
           </a:p>
@@ -3229,7 +3229,7 @@
             <a:fld id="{6F1E101A-BD3B-B542-8690-1916D72F307E}" type="datetime1">
               <a:rPr lang="de-DE" smtClean="0"/>
               <a:pPr/>
-              <a:t>21.07.2023</a:t>
+              <a:t>02.08.2023</a:t>
             </a:fld>
             <a:endParaRPr lang="de-DE" dirty="0"/>
           </a:p>
@@ -3423,7 +3423,7 @@
             <a:fld id="{6F1E101A-BD3B-B542-8690-1916D72F307E}" type="datetime1">
               <a:rPr lang="de-DE" smtClean="0"/>
               <a:pPr/>
-              <a:t>21.07.2023</a:t>
+              <a:t>02.08.2023</a:t>
             </a:fld>
             <a:endParaRPr lang="de-DE" dirty="0"/>
           </a:p>
@@ -3667,7 +3667,7 @@
             <a:fld id="{6F1E101A-BD3B-B542-8690-1916D72F307E}" type="datetime1">
               <a:rPr lang="de-DE" smtClean="0"/>
               <a:pPr/>
-              <a:t>21.07.2023</a:t>
+              <a:t>02.08.2023</a:t>
             </a:fld>
             <a:endParaRPr lang="de-DE" dirty="0"/>
           </a:p>
@@ -3982,7 +3982,7 @@
             <a:fld id="{6F1E101A-BD3B-B542-8690-1916D72F307E}" type="datetime1">
               <a:rPr lang="de-DE" smtClean="0"/>
               <a:pPr/>
-              <a:t>21.07.2023</a:t>
+              <a:t>02.08.2023</a:t>
             </a:fld>
             <a:endParaRPr lang="de-DE" dirty="0"/>
           </a:p>
@@ -4517,7 +4517,7 @@
             <a:fld id="{6F1E101A-BD3B-B542-8690-1916D72F307E}" type="datetime1">
               <a:rPr lang="de-DE" smtClean="0"/>
               <a:pPr/>
-              <a:t>21.07.2023</a:t>
+              <a:t>02.08.2023</a:t>
             </a:fld>
             <a:endParaRPr lang="de-DE" dirty="0"/>
           </a:p>
@@ -4903,7 +4903,7 @@
             <a:fld id="{6F1E101A-BD3B-B542-8690-1916D72F307E}" type="datetime1">
               <a:rPr lang="de-DE" smtClean="0"/>
               <a:pPr/>
-              <a:t>21.07.2023</a:t>
+              <a:t>02.08.2023</a:t>
             </a:fld>
             <a:endParaRPr lang="de-DE" dirty="0"/>
           </a:p>
@@ -5210,7 +5210,7 @@
           <a:p>
             <a:fld id="{6F1E101A-BD3B-B542-8690-1916D72F307E}" type="datetime1">
               <a:rPr lang="de-DE" smtClean="0"/>
-              <a:t>21.07.2023</a:t>
+              <a:t>02.08.2023</a:t>
             </a:fld>
             <a:endParaRPr lang="de-DE" dirty="0"/>
           </a:p>
@@ -5329,7 +5329,7 @@
           <a:p>
             <a:fld id="{6F1E101A-BD3B-B542-8690-1916D72F307E}" type="datetime1">
               <a:rPr lang="de-DE" smtClean="0"/>
-              <a:t>21.07.2023</a:t>
+              <a:t>02.08.2023</a:t>
             </a:fld>
             <a:endParaRPr lang="de-DE" dirty="0"/>
           </a:p>
@@ -5552,7 +5552,7 @@
             <a:fld id="{6F1E101A-BD3B-B542-8690-1916D72F307E}" type="datetime1">
               <a:rPr lang="de-DE" smtClean="0"/>
               <a:pPr/>
-              <a:t>21.07.2023</a:t>
+              <a:t>02.08.2023</a:t>
             </a:fld>
             <a:endParaRPr lang="de-DE" dirty="0"/>
           </a:p>
@@ -6229,7 +6229,7 @@
           <a:p>
             <a:fld id="{6F1E101A-BD3B-B542-8690-1916D72F307E}" type="datetime1">
               <a:rPr lang="de-DE" smtClean="0"/>
-              <a:t>21.07.2023</a:t>
+              <a:t>02.08.2023</a:t>
             </a:fld>
             <a:endParaRPr lang="de-DE" dirty="0"/>
           </a:p>
@@ -7547,7 +7547,7 @@
             <a:fld id="{6F1E101A-BD3B-B542-8690-1916D72F307E}" type="datetime1">
               <a:rPr lang="de-DE" smtClean="0"/>
               <a:pPr/>
-              <a:t>21.07.2023</a:t>
+              <a:t>02.08.2023</a:t>
             </a:fld>
             <a:endParaRPr lang="de-DE" dirty="0"/>
           </a:p>
@@ -7754,7 +7754,7 @@
                 <a:tabLst/>
                 <a:defRPr/>
               </a:pPr>
-              <a:t>21.07.2023</a:t>
+              <a:t>02.08.2023</a:t>
             </a:fld>
             <a:endParaRPr kumimoji="0" lang="de-DE" sz="1800" b="0" i="0" u="none" strike="noStrike" kern="1200" cap="none" spc="0" normalizeH="0" baseline="0" noProof="0" dirty="0">
               <a:ln>
@@ -7915,7 +7915,7 @@
                 <a:tabLst/>
                 <a:defRPr/>
               </a:pPr>
-              <a:t>21.07.2023</a:t>
+              <a:t>02.08.2023</a:t>
             </a:fld>
             <a:endParaRPr kumimoji="0" lang="de-DE" sz="1800" b="0" i="0" u="none" strike="noStrike" kern="1200" cap="none" spc="0" normalizeH="0" baseline="0" noProof="0" dirty="0">
               <a:ln>
@@ -8704,7 +8704,7 @@
                 <a:tabLst/>
                 <a:defRPr/>
               </a:pPr>
-              <a:t>21.07.2023</a:t>
+              <a:t>02.08.2023</a:t>
             </a:fld>
             <a:endParaRPr kumimoji="0" lang="de-DE" sz="1800" b="0" i="0" u="none" strike="noStrike" kern="1200" cap="none" spc="0" normalizeH="0" baseline="0" noProof="0" dirty="0">
               <a:ln>
@@ -9248,7 +9248,7 @@
                 <a:tabLst/>
                 <a:defRPr/>
               </a:pPr>
-              <a:t>21.07.2023</a:t>
+              <a:t>02.08.2023</a:t>
             </a:fld>
             <a:endParaRPr kumimoji="0" lang="de-DE" sz="1800" b="0" i="0" u="none" strike="noStrike" kern="1200" cap="none" spc="0" normalizeH="0" baseline="0" noProof="0" dirty="0">
               <a:ln>
@@ -9540,7 +9540,7 @@
                 <a:tabLst/>
                 <a:defRPr/>
               </a:pPr>
-              <a:t>21.07.2023</a:t>
+              <a:t>02.08.2023</a:t>
             </a:fld>
             <a:endParaRPr kumimoji="0" lang="de-DE" sz="1800" b="0" i="0" u="none" strike="noStrike" kern="1200" cap="none" spc="0" normalizeH="0" baseline="0" noProof="0" dirty="0">
               <a:ln>
@@ -9795,7 +9795,7 @@
                 <a:tabLst/>
                 <a:defRPr/>
               </a:pPr>
-              <a:t>21.07.2023</a:t>
+              <a:t>02.08.2023</a:t>
             </a:fld>
             <a:endParaRPr kumimoji="0" lang="de-DE" sz="1800" b="0" i="0" u="none" strike="noStrike" kern="1200" cap="none" spc="0" normalizeH="0" baseline="0" noProof="0" dirty="0">
               <a:ln>
@@ -9993,7 +9993,7 @@
                 <a:tabLst/>
                 <a:defRPr/>
               </a:pPr>
-              <a:t>21.07.2023</a:t>
+              <a:t>02.08.2023</a:t>
             </a:fld>
             <a:endParaRPr kumimoji="0" lang="de-DE" sz="1800" b="0" i="0" u="none" strike="noStrike" kern="1200" cap="none" spc="0" normalizeH="0" baseline="0" noProof="0" dirty="0">
               <a:ln>
@@ -10379,7 +10379,7 @@
                 <a:tabLst/>
                 <a:defRPr/>
               </a:pPr>
-              <a:t>21.07.2023</a:t>
+              <a:t>02.08.2023</a:t>
             </a:fld>
             <a:endParaRPr kumimoji="0" lang="de-DE" sz="1800" b="0" i="0" u="none" strike="noStrike" kern="1200" cap="none" spc="0" normalizeH="0" baseline="0" noProof="0" dirty="0">
               <a:ln>
@@ -10896,7 +10896,7 @@
                 <a:tabLst/>
                 <a:defRPr/>
               </a:pPr>
-              <a:t>21.07.2023</a:t>
+              <a:t>02.08.2023</a:t>
             </a:fld>
             <a:endParaRPr kumimoji="0" lang="de-DE" sz="1800" b="0" i="0" u="none" strike="noStrike" kern="1200" cap="none" spc="0" normalizeH="0" baseline="0" noProof="0" dirty="0">
               <a:ln>
@@ -11124,7 +11124,7 @@
                 <a:tabLst/>
                 <a:defRPr/>
               </a:pPr>
-              <a:t>21.07.2023</a:t>
+              <a:t>02.08.2023</a:t>
             </a:fld>
             <a:endParaRPr kumimoji="0" lang="de-DE" sz="1800" b="0" i="0" u="none" strike="noStrike" kern="1200" cap="none" spc="0" normalizeH="0" baseline="0" noProof="0" dirty="0">
               <a:ln>
@@ -11548,7 +11548,7 @@
                 <a:tabLst/>
                 <a:defRPr/>
               </a:pPr>
-              <a:t>21.07.2023</a:t>
+              <a:t>02.08.2023</a:t>
             </a:fld>
             <a:endParaRPr kumimoji="0" lang="de-DE" sz="1800" b="0" i="0" u="none" strike="noStrike" kern="1200" cap="none" spc="0" normalizeH="0" baseline="0" noProof="0" dirty="0">
               <a:ln>
@@ -11746,7 +11746,7 @@
                 <a:tabLst/>
                 <a:defRPr/>
               </a:pPr>
-              <a:t>21.07.2023</a:t>
+              <a:t>02.08.2023</a:t>
             </a:fld>
             <a:endParaRPr kumimoji="0" lang="de-DE" sz="1800" b="0" i="0" u="none" strike="noStrike" kern="1200" cap="none" spc="0" normalizeH="0" baseline="0" noProof="0" dirty="0">
               <a:ln>
@@ -12132,7 +12132,7 @@
             <a:fld id="{6F1E101A-BD3B-B542-8690-1916D72F307E}" type="datetime1">
               <a:rPr lang="de-DE" smtClean="0"/>
               <a:pPr/>
-              <a:t>21.07.2023</a:t>
+              <a:t>02.08.2023</a:t>
             </a:fld>
             <a:endParaRPr lang="de-DE" dirty="0"/>
           </a:p>
@@ -12362,7 +12362,7 @@
                 <a:tabLst/>
                 <a:defRPr/>
               </a:pPr>
-              <a:t>21.07.2023</a:t>
+              <a:t>02.08.2023</a:t>
             </a:fld>
             <a:endParaRPr kumimoji="0" lang="de-DE" sz="1800" b="0" i="0" u="none" strike="noStrike" kern="1200" cap="none" spc="0" normalizeH="0" baseline="0" noProof="0" dirty="0">
               <a:ln>
@@ -12937,7 +12937,7 @@
                 <a:tabLst/>
                 <a:defRPr/>
               </a:pPr>
-              <a:t>21.07.2023</a:t>
+              <a:t>02.08.2023</a:t>
             </a:fld>
             <a:endParaRPr kumimoji="0" lang="de-DE" sz="1800" b="0" i="0" u="none" strike="noStrike" kern="1200" cap="none" spc="0" normalizeH="0" baseline="0" noProof="0" dirty="0">
               <a:ln>
@@ -13691,7 +13691,7 @@
                 <a:tabLst/>
                 <a:defRPr/>
               </a:pPr>
-              <a:t>21.07.2023</a:t>
+              <a:t>02.08.2023</a:t>
             </a:fld>
             <a:endParaRPr kumimoji="0" lang="de-DE" sz="1800" b="0" i="0" u="none" strike="noStrike" kern="1200" cap="none" spc="0" normalizeH="0" baseline="0" noProof="0" dirty="0">
               <a:ln>
@@ -14282,7 +14282,7 @@
                 <a:tabLst/>
                 <a:defRPr/>
               </a:pPr>
-              <a:t>21.07.2023</a:t>
+              <a:t>02.08.2023</a:t>
             </a:fld>
             <a:endParaRPr kumimoji="0" lang="de-DE" sz="1800" b="0" i="0" u="none" strike="noStrike" kern="1200" cap="none" spc="0" normalizeH="0" baseline="0" noProof="0" dirty="0">
               <a:ln>
@@ -14842,7 +14842,7 @@
                 <a:tabLst/>
                 <a:defRPr/>
               </a:pPr>
-              <a:t>21.07.2023</a:t>
+              <a:t>02.08.2023</a:t>
             </a:fld>
             <a:endParaRPr kumimoji="0" lang="de-DE" sz="1800" b="0" i="0" u="none" strike="noStrike" kern="1200" cap="none" spc="0" normalizeH="0" baseline="0" noProof="0" dirty="0">
               <a:ln>
@@ -15040,7 +15040,7 @@
                 <a:tabLst/>
                 <a:defRPr/>
               </a:pPr>
-              <a:t>21.07.2023</a:t>
+              <a:t>02.08.2023</a:t>
             </a:fld>
             <a:endParaRPr kumimoji="0" lang="de-DE" sz="1800" b="0" i="0" u="none" strike="noStrike" kern="1200" cap="none" spc="0" normalizeH="0" baseline="0" noProof="0" dirty="0">
               <a:ln>
@@ -15504,7 +15504,7 @@
                 <a:tabLst/>
                 <a:defRPr/>
               </a:pPr>
-              <a:t>21.07.2023</a:t>
+              <a:t>02.08.2023</a:t>
             </a:fld>
             <a:endParaRPr kumimoji="0" lang="de-DE" sz="1800" b="0" i="0" u="none" strike="noStrike" kern="1200" cap="none" spc="0" normalizeH="0" baseline="0" noProof="0" dirty="0">
               <a:ln>

</xml_diff>